<commit_message>
edited repo location and note
</commit_message>
<xml_diff>
--- a/intro to js.pptx
+++ b/intro to js.pptx
@@ -5334,14 +5334,23 @@
           <a:p>
             <a:r>
               <a:rPr lang="en-US" dirty="0" smtClean="0"/>
-              <a:t>A little overview of some terminology behind web development</a:t>
-            </a:r>
-          </a:p>
-          <a:p>
-            <a:r>
-              <a:rPr lang="en-US" dirty="0" smtClean="0"/>
-              <a:t>A note about JSON and maximizing data portability</a:t>
-            </a:r>
+              <a:t>A </a:t>
+            </a:r>
+            <a:r>
+              <a:rPr lang="en-US" dirty="0" smtClean="0"/>
+              <a:t>short </a:t>
+            </a:r>
+            <a:r>
+              <a:rPr lang="en-US" dirty="0" smtClean="0"/>
+              <a:t>overview of some terminology behind web development</a:t>
+            </a:r>
+          </a:p>
+          <a:p>
+            <a:r>
+              <a:rPr lang="en-US" dirty="0" smtClean="0"/>
+              <a:t>Setting up a local webserver</a:t>
+            </a:r>
+            <a:endParaRPr lang="en-US" dirty="0" smtClean="0"/>
           </a:p>
           <a:p>
             <a:r>
@@ -5439,32 +5448,25 @@
             </a:r>
             <a:r>
               <a:rPr lang="en-US" sz="4000" b="1" dirty="0"/>
-              <a:t>http://</a:t>
-            </a:r>
-            <a:r>
-              <a:rPr lang="en-US" sz="4000" b="1" dirty="0" smtClean="0"/>
-              <a:t>bit.ly/2mRzSc3</a:t>
-            </a:r>
+              <a:t>http://bit.ly/2F2RrgF</a:t>
+            </a:r>
+            <a:endParaRPr lang="en-US" sz="4000" b="1" dirty="0" smtClean="0"/>
           </a:p>
           <a:p>
             <a:r>
               <a:rPr lang="en-US" sz="4000" dirty="0" smtClean="0"/>
-              <a:t>MDN </a:t>
-            </a:r>
-            <a:r>
-              <a:rPr lang="en-US" sz="4000" dirty="0" smtClean="0"/>
-              <a:t>(Mozilla Developer Network) – Best ECMAScript/JavaScript reference out </a:t>
-            </a:r>
-            <a:r>
-              <a:rPr lang="en-US" sz="4000" dirty="0" smtClean="0"/>
-              <a:t>there</a:t>
+              <a:t>MDN (Mozilla Developer Network) – Best ECMAScript/JavaScript reference out there</a:t>
             </a:r>
           </a:p>
           <a:p>
             <a:pPr lvl="1"/>
             <a:r>
               <a:rPr lang="en-US" sz="3600" dirty="0" smtClean="0"/>
-              <a:t>Guide to Dynamic </a:t>
+              <a:t>Guide </a:t>
+            </a:r>
+            <a:r>
+              <a:rPr lang="en-US" sz="3600" dirty="0" smtClean="0"/>
+              <a:t>to Dynamic </a:t>
             </a:r>
             <a:r>
               <a:rPr lang="en-US" sz="3600" dirty="0" err="1" smtClean="0"/>
@@ -5489,7 +5491,6 @@
               <a:rPr lang="en-US" sz="3600" dirty="0" smtClean="0"/>
               <a:t> party APIs</a:t>
             </a:r>
-            <a:endParaRPr lang="en-US" sz="3600" dirty="0" smtClean="0"/>
           </a:p>
           <a:p>
             <a:pPr lvl="1"/>
@@ -5497,7 +5498,6 @@
               <a:rPr lang="en-US" sz="3600" dirty="0" smtClean="0"/>
               <a:t>Guide to Server-Side programming</a:t>
             </a:r>
-            <a:endParaRPr lang="en-US" sz="3600" dirty="0" smtClean="0"/>
           </a:p>
           <a:p>
             <a:pPr lvl="1"/>
@@ -6708,7 +6708,6 @@
               <a:rPr lang="en-US" dirty="0"/>
               <a:t>+</a:t>
             </a:r>
-            <a:endParaRPr lang="en-US" dirty="0"/>
           </a:p>
         </p:txBody>
       </p:sp>

</xml_diff>